<commit_message>
add back week12 slides to docs
</commit_message>
<xml_diff>
--- a/docs/_downloads/b7e9f797068d91db7c0b1cb80f6ff687/Week12.pptx
+++ b/docs/_downloads/b7e9f797068d91db7c0b1cb80f6ff687/Week12.pptx
@@ -256,7 +256,7 @@
           <a:p>
             <a:fld id="{BEA41A63-7B47-4A6F-A5C2-455AA724337F}" type="datetimeFigureOut">
               <a:rPr lang="en-US" smtClean="0"/>
-              <a:t>12/6/2018</a:t>
+              <a:t>5/2/19</a:t>
             </a:fld>
             <a:endParaRPr lang="en-US"/>
           </a:p>
@@ -792,7 +792,7 @@
           <a:p>
             <a:fld id="{25542445-7827-485E-A07F-5F2DBE279DB7}" type="datetime1">
               <a:rPr lang="en-US" smtClean="0"/>
-              <a:t>12/6/2018</a:t>
+              <a:t>5/2/19</a:t>
             </a:fld>
             <a:endParaRPr lang="en-US"/>
           </a:p>
@@ -1090,7 +1090,7 @@
           <a:p>
             <a:fld id="{6C51F374-3F8C-4FFA-9983-A6A25C4F103E}" type="datetime1">
               <a:rPr lang="en-US" smtClean="0"/>
-              <a:t>12/6/2018</a:t>
+              <a:t>5/2/19</a:t>
             </a:fld>
             <a:endParaRPr lang="en-US"/>
           </a:p>
@@ -1282,7 +1282,7 @@
           <a:p>
             <a:fld id="{2520D5A2-3B73-42CD-BC24-D6D55A75CD73}" type="datetime1">
               <a:rPr lang="en-US" smtClean="0"/>
-              <a:t>12/6/2018</a:t>
+              <a:t>5/2/19</a:t>
             </a:fld>
             <a:endParaRPr lang="en-US"/>
           </a:p>
@@ -1543,7 +1543,7 @@
           <a:p>
             <a:fld id="{197CCDE4-9E16-495D-B246-D6614F624619}" type="datetime1">
               <a:rPr lang="en-US" smtClean="0"/>
-              <a:t>12/6/2018</a:t>
+              <a:t>5/2/19</a:t>
             </a:fld>
             <a:endParaRPr lang="en-US"/>
           </a:p>
@@ -1967,7 +1967,7 @@
           <a:p>
             <a:fld id="{603F160F-99EA-46D1-883B-92FA4018FFDF}" type="datetime1">
               <a:rPr lang="en-US" smtClean="0"/>
-              <a:t>12/6/2018</a:t>
+              <a:t>5/2/19</a:t>
             </a:fld>
             <a:endParaRPr lang="en-US"/>
           </a:p>
@@ -2504,7 +2504,7 @@
           <a:p>
             <a:fld id="{7654A95D-8C23-43E9-8B6C-4C1DC42927CA}" type="datetime1">
               <a:rPr lang="en-US" smtClean="0"/>
-              <a:t>12/6/2018</a:t>
+              <a:t>5/2/19</a:t>
             </a:fld>
             <a:endParaRPr lang="en-US"/>
           </a:p>
@@ -3368,7 +3368,7 @@
           <a:p>
             <a:fld id="{13ECFB62-5E5E-4028-BE74-E8180741060B}" type="datetime1">
               <a:rPr lang="en-US" smtClean="0"/>
-              <a:t>12/6/2018</a:t>
+              <a:t>5/2/19</a:t>
             </a:fld>
             <a:endParaRPr lang="en-US"/>
           </a:p>
@@ -3538,7 +3538,7 @@
           <a:p>
             <a:fld id="{B8E8F04D-8336-4013-A848-3D006F35E6D8}" type="datetime1">
               <a:rPr lang="en-US" smtClean="0"/>
-              <a:t>12/6/2018</a:t>
+              <a:t>5/2/19</a:t>
             </a:fld>
             <a:endParaRPr lang="en-US"/>
           </a:p>
@@ -3722,7 +3722,7 @@
           <a:p>
             <a:fld id="{D5E0D1ED-96A4-4121-8DC1-9DE9404FF22B}" type="datetime1">
               <a:rPr lang="en-US" smtClean="0"/>
-              <a:t>12/6/2018</a:t>
+              <a:t>5/2/19</a:t>
             </a:fld>
             <a:endParaRPr lang="en-US"/>
           </a:p>
@@ -3896,7 +3896,7 @@
           <a:p>
             <a:fld id="{F5E2D353-5641-4A8D-A337-D9696F3514E2}" type="datetime1">
               <a:rPr lang="en-US" smtClean="0"/>
-              <a:t>12/6/2018</a:t>
+              <a:t>5/2/19</a:t>
             </a:fld>
             <a:endParaRPr lang="en-US"/>
           </a:p>
@@ -4140,7 +4140,7 @@
           <a:p>
             <a:fld id="{58504EDF-87C4-4B18-BA6D-F60FA908AFF7}" type="datetime1">
               <a:rPr lang="en-US" smtClean="0"/>
-              <a:t>12/6/2018</a:t>
+              <a:t>5/2/19</a:t>
             </a:fld>
             <a:endParaRPr lang="en-US"/>
           </a:p>
@@ -4376,7 +4376,7 @@
           <a:p>
             <a:fld id="{EC1F68FD-A8AA-4671-B443-2BA41C082882}" type="datetime1">
               <a:rPr lang="en-US" smtClean="0"/>
-              <a:t>12/6/2018</a:t>
+              <a:t>5/2/19</a:t>
             </a:fld>
             <a:endParaRPr lang="en-US"/>
           </a:p>
@@ -4842,7 +4842,7 @@
           <a:p>
             <a:fld id="{B37F1E63-D3AF-47CE-984C-5813DC5C2313}" type="datetime1">
               <a:rPr lang="en-US" smtClean="0"/>
-              <a:t>12/6/2018</a:t>
+              <a:t>5/2/19</a:t>
             </a:fld>
             <a:endParaRPr lang="en-US"/>
           </a:p>
@@ -4964,7 +4964,7 @@
           <a:p>
             <a:fld id="{3D074202-E861-4F8F-B12C-3CAE1B8DDBC1}" type="datetime1">
               <a:rPr lang="en-US" smtClean="0"/>
-              <a:t>12/6/2018</a:t>
+              <a:t>5/2/19</a:t>
             </a:fld>
             <a:endParaRPr lang="en-US"/>
           </a:p>
@@ -5059,7 +5059,7 @@
           <a:p>
             <a:fld id="{77FD7A27-1F60-40A1-AEB5-104F9B04DF77}" type="datetime1">
               <a:rPr lang="en-US" smtClean="0"/>
-              <a:t>12/6/2018</a:t>
+              <a:t>5/2/19</a:t>
             </a:fld>
             <a:endParaRPr lang="en-US"/>
           </a:p>
@@ -5314,7 +5314,7 @@
           <a:p>
             <a:fld id="{56B81EE0-EF66-4C0F-9CED-3FD6567D9AA6}" type="datetime1">
               <a:rPr lang="en-US" smtClean="0"/>
-              <a:t>12/6/2018</a:t>
+              <a:t>5/2/19</a:t>
             </a:fld>
             <a:endParaRPr lang="en-US"/>
           </a:p>
@@ -5614,7 +5614,7 @@
           <a:p>
             <a:fld id="{72DACF11-A55B-4E9B-9C80-52813F7B67AC}" type="datetime1">
               <a:rPr lang="en-US" smtClean="0"/>
-              <a:t>12/6/2018</a:t>
+              <a:t>5/2/19</a:t>
             </a:fld>
             <a:endParaRPr lang="en-US"/>
           </a:p>
@@ -5848,7 +5848,7 @@
           <a:p>
             <a:fld id="{BE66E254-AFBD-44AF-ABE7-62B6D7A18AF6}" type="datetime1">
               <a:rPr lang="en-US" smtClean="0"/>
-              <a:t>12/6/2018</a:t>
+              <a:t>5/2/19</a:t>
             </a:fld>
             <a:endParaRPr lang="en-US"/>
           </a:p>
@@ -6574,14 +6574,14 @@
             <a:pPr algn="l"/>
             <a:r>
               <a:rPr lang="en-US" dirty="0"/>
-              <a:t>Ayal Gussow</a:t>
+              <a:t>Martin Skarzynski</a:t>
             </a:r>
           </a:p>
           <a:p>
             <a:pPr algn="l"/>
             <a:r>
               <a:rPr lang="en-US" dirty="0"/>
-              <a:t>12/06/2018</a:t>
+              <a:t>2019-05-02</a:t>
             </a:r>
           </a:p>
         </p:txBody>

</xml_diff>